<commit_message>
Modified: Class 2.pptx embedded fonts
</commit_message>
<xml_diff>
--- a/Class 2.pptx
+++ b/Class 2.pptx
@@ -1,6 +1,6 @@
 
 <file path=ppt/presentation.xml><?xml version="1.0" encoding="utf-8"?>
-<p:presentation xmlns:a="http://schemas.openxmlformats.org/drawingml/2006/main" xmlns:r="http://schemas.openxmlformats.org/officeDocument/2006/relationships" xmlns:p="http://schemas.openxmlformats.org/presentationml/2006/main" saveSubsetFonts="1">
+<p:presentation xmlns:a="http://schemas.openxmlformats.org/drawingml/2006/main" xmlns:r="http://schemas.openxmlformats.org/officeDocument/2006/relationships" xmlns:p="http://schemas.openxmlformats.org/presentationml/2006/main" embedTrueTypeFonts="1" saveSubsetFonts="1">
   <p:sldMasterIdLst>
     <p:sldMasterId id="2147483660" r:id="rId1"/>
   </p:sldMasterIdLst>
@@ -34,6 +34,35 @@
   </p:sldIdLst>
   <p:sldSz cx="12192000" cy="6858000"/>
   <p:notesSz cx="6858000" cy="9144000"/>
+  <p:embeddedFontLst>
+    <p:embeddedFont>
+      <p:font typeface="微軟正黑體" panose="020B0604030504040204" pitchFamily="34" charset="-120"/>
+      <p:regular r:id="rId28"/>
+      <p:bold r:id="rId29"/>
+    </p:embeddedFont>
+    <p:embeddedFont>
+      <p:font typeface="源流明體 SB" panose="02020600000000000000" pitchFamily="18" charset="-120"/>
+      <p:bold r:id="rId30"/>
+    </p:embeddedFont>
+    <p:embeddedFont>
+      <p:font typeface="Consolas" panose="020B0609020204030204" pitchFamily="49" charset="0"/>
+      <p:regular r:id="rId31"/>
+      <p:bold r:id="rId32"/>
+      <p:italic r:id="rId33"/>
+      <p:boldItalic r:id="rId34"/>
+    </p:embeddedFont>
+    <p:embeddedFont>
+      <p:font typeface="Hack NF" panose="020B0609030202020204" pitchFamily="49" charset="0"/>
+      <p:regular r:id="rId35"/>
+      <p:bold r:id="rId36"/>
+      <p:italic r:id="rId37"/>
+      <p:boldItalic r:id="rId38"/>
+    </p:embeddedFont>
+    <p:embeddedFont>
+      <p:font typeface="Wingdings 2" panose="05020102010507070707" pitchFamily="18" charset="2"/>
+      <p:regular r:id="rId39"/>
+    </p:embeddedFont>
+  </p:embeddedFontLst>
   <p:defaultTextStyle>
     <a:defPPr>
       <a:defRPr lang="en-US"/>

</xml_diff>